<commit_message>
i create a slideshow with docker
</commit_message>
<xml_diff>
--- a/Clases/Clase 4/clase 4.pptx
+++ b/Clases/Clase 4/clase 4.pptx
@@ -166,7 +166,7 @@
           </a:lstStyle>
           <a:p>
             <a:r>
-              <a:rPr lang="es-ES" smtClean="0"/>
+              <a:rPr lang="es-ES"/>
               <a:t>Haga clic para modificar el estilo de título del patrón</a:t>
             </a:r>
             <a:endParaRPr lang="es-MX"/>
@@ -231,7 +231,7 @@
           </a:lstStyle>
           <a:p>
             <a:r>
-              <a:rPr lang="es-ES" smtClean="0"/>
+              <a:rPr lang="es-ES"/>
               <a:t>Haga clic para modificar el estilo de subtítulo del patrón</a:t>
             </a:r>
             <a:endParaRPr lang="es-MX"/>
@@ -255,7 +255,7 @@
           <a:p>
             <a:fld id="{126F170E-E814-4B3B-A85B-D0CEE3E81FCB}" type="datetimeFigureOut">
               <a:rPr lang="es-MX" smtClean="0"/>
-              <a:t>14/01/2020</a:t>
+              <a:t>03/02/2022</a:t>
             </a:fld>
             <a:endParaRPr lang="es-MX"/>
           </a:p>
@@ -349,7 +349,7 @@
           <a:lstStyle/>
           <a:p>
             <a:r>
-              <a:rPr lang="es-ES" smtClean="0"/>
+              <a:rPr lang="es-ES"/>
               <a:t>Haga clic para modificar el estilo de título del patrón</a:t>
             </a:r>
             <a:endParaRPr lang="es-MX"/>
@@ -373,35 +373,35 @@
           <a:p>
             <a:pPr lvl="0"/>
             <a:r>
-              <a:rPr lang="es-ES" smtClean="0"/>
+              <a:rPr lang="es-ES"/>
               <a:t>Haga clic para modificar el estilo de texto del patrón</a:t>
             </a:r>
           </a:p>
           <a:p>
             <a:pPr lvl="1"/>
             <a:r>
-              <a:rPr lang="es-ES" smtClean="0"/>
+              <a:rPr lang="es-ES"/>
               <a:t>Segundo nivel</a:t>
             </a:r>
           </a:p>
           <a:p>
             <a:pPr lvl="2"/>
             <a:r>
-              <a:rPr lang="es-ES" smtClean="0"/>
+              <a:rPr lang="es-ES"/>
               <a:t>Tercer nivel</a:t>
             </a:r>
           </a:p>
           <a:p>
             <a:pPr lvl="3"/>
             <a:r>
-              <a:rPr lang="es-ES" smtClean="0"/>
+              <a:rPr lang="es-ES"/>
               <a:t>Cuarto nivel</a:t>
             </a:r>
           </a:p>
           <a:p>
             <a:pPr lvl="4"/>
             <a:r>
-              <a:rPr lang="es-ES" smtClean="0"/>
+              <a:rPr lang="es-ES"/>
               <a:t>Quinto nivel</a:t>
             </a:r>
             <a:endParaRPr lang="es-MX"/>
@@ -425,7 +425,7 @@
           <a:p>
             <a:fld id="{126F170E-E814-4B3B-A85B-D0CEE3E81FCB}" type="datetimeFigureOut">
               <a:rPr lang="es-MX" smtClean="0"/>
-              <a:t>14/01/2020</a:t>
+              <a:t>03/02/2022</a:t>
             </a:fld>
             <a:endParaRPr lang="es-MX"/>
           </a:p>
@@ -524,7 +524,7 @@
           <a:lstStyle/>
           <a:p>
             <a:r>
-              <a:rPr lang="es-ES" smtClean="0"/>
+              <a:rPr lang="es-ES"/>
               <a:t>Haga clic para modificar el estilo de título del patrón</a:t>
             </a:r>
             <a:endParaRPr lang="es-MX"/>
@@ -553,35 +553,35 @@
           <a:p>
             <a:pPr lvl="0"/>
             <a:r>
-              <a:rPr lang="es-ES" smtClean="0"/>
+              <a:rPr lang="es-ES"/>
               <a:t>Haga clic para modificar el estilo de texto del patrón</a:t>
             </a:r>
           </a:p>
           <a:p>
             <a:pPr lvl="1"/>
             <a:r>
-              <a:rPr lang="es-ES" smtClean="0"/>
+              <a:rPr lang="es-ES"/>
               <a:t>Segundo nivel</a:t>
             </a:r>
           </a:p>
           <a:p>
             <a:pPr lvl="2"/>
             <a:r>
-              <a:rPr lang="es-ES" smtClean="0"/>
+              <a:rPr lang="es-ES"/>
               <a:t>Tercer nivel</a:t>
             </a:r>
           </a:p>
           <a:p>
             <a:pPr lvl="3"/>
             <a:r>
-              <a:rPr lang="es-ES" smtClean="0"/>
+              <a:rPr lang="es-ES"/>
               <a:t>Cuarto nivel</a:t>
             </a:r>
           </a:p>
           <a:p>
             <a:pPr lvl="4"/>
             <a:r>
-              <a:rPr lang="es-ES" smtClean="0"/>
+              <a:rPr lang="es-ES"/>
               <a:t>Quinto nivel</a:t>
             </a:r>
             <a:endParaRPr lang="es-MX"/>
@@ -605,7 +605,7 @@
           <a:p>
             <a:fld id="{126F170E-E814-4B3B-A85B-D0CEE3E81FCB}" type="datetimeFigureOut">
               <a:rPr lang="es-MX" smtClean="0"/>
-              <a:t>14/01/2020</a:t>
+              <a:t>03/02/2022</a:t>
             </a:fld>
             <a:endParaRPr lang="es-MX"/>
           </a:p>
@@ -699,7 +699,7 @@
           <a:lstStyle/>
           <a:p>
             <a:r>
-              <a:rPr lang="es-ES" smtClean="0"/>
+              <a:rPr lang="es-ES"/>
               <a:t>Haga clic para modificar el estilo de título del patrón</a:t>
             </a:r>
             <a:endParaRPr lang="es-MX"/>
@@ -723,35 +723,35 @@
           <a:p>
             <a:pPr lvl="0"/>
             <a:r>
-              <a:rPr lang="es-ES" smtClean="0"/>
+              <a:rPr lang="es-ES"/>
               <a:t>Haga clic para modificar el estilo de texto del patrón</a:t>
             </a:r>
           </a:p>
           <a:p>
             <a:pPr lvl="1"/>
             <a:r>
-              <a:rPr lang="es-ES" smtClean="0"/>
+              <a:rPr lang="es-ES"/>
               <a:t>Segundo nivel</a:t>
             </a:r>
           </a:p>
           <a:p>
             <a:pPr lvl="2"/>
             <a:r>
-              <a:rPr lang="es-ES" smtClean="0"/>
+              <a:rPr lang="es-ES"/>
               <a:t>Tercer nivel</a:t>
             </a:r>
           </a:p>
           <a:p>
             <a:pPr lvl="3"/>
             <a:r>
-              <a:rPr lang="es-ES" smtClean="0"/>
+              <a:rPr lang="es-ES"/>
               <a:t>Cuarto nivel</a:t>
             </a:r>
           </a:p>
           <a:p>
             <a:pPr lvl="4"/>
             <a:r>
-              <a:rPr lang="es-ES" smtClean="0"/>
+              <a:rPr lang="es-ES"/>
               <a:t>Quinto nivel</a:t>
             </a:r>
             <a:endParaRPr lang="es-MX"/>
@@ -775,7 +775,7 @@
           <a:p>
             <a:fld id="{126F170E-E814-4B3B-A85B-D0CEE3E81FCB}" type="datetimeFigureOut">
               <a:rPr lang="es-MX" smtClean="0"/>
-              <a:t>14/01/2020</a:t>
+              <a:t>03/02/2022</a:t>
             </a:fld>
             <a:endParaRPr lang="es-MX"/>
           </a:p>
@@ -878,7 +878,7 @@
           </a:lstStyle>
           <a:p>
             <a:r>
-              <a:rPr lang="es-ES" smtClean="0"/>
+              <a:rPr lang="es-ES"/>
               <a:t>Haga clic para modificar el estilo de título del patrón</a:t>
             </a:r>
             <a:endParaRPr lang="es-MX"/>
@@ -998,7 +998,7 @@
           <a:p>
             <a:pPr lvl="0"/>
             <a:r>
-              <a:rPr lang="es-ES" smtClean="0"/>
+              <a:rPr lang="es-ES"/>
               <a:t>Haga clic para modificar el estilo de texto del patrón</a:t>
             </a:r>
           </a:p>
@@ -1021,7 +1021,7 @@
           <a:p>
             <a:fld id="{126F170E-E814-4B3B-A85B-D0CEE3E81FCB}" type="datetimeFigureOut">
               <a:rPr lang="es-MX" smtClean="0"/>
-              <a:t>14/01/2020</a:t>
+              <a:t>03/02/2022</a:t>
             </a:fld>
             <a:endParaRPr lang="es-MX"/>
           </a:p>
@@ -1115,7 +1115,7 @@
           <a:lstStyle/>
           <a:p>
             <a:r>
-              <a:rPr lang="es-ES" smtClean="0"/>
+              <a:rPr lang="es-ES"/>
               <a:t>Haga clic para modificar el estilo de título del patrón</a:t>
             </a:r>
             <a:endParaRPr lang="es-MX"/>
@@ -1144,35 +1144,35 @@
           <a:p>
             <a:pPr lvl="0"/>
             <a:r>
-              <a:rPr lang="es-ES" smtClean="0"/>
+              <a:rPr lang="es-ES"/>
               <a:t>Haga clic para modificar el estilo de texto del patrón</a:t>
             </a:r>
           </a:p>
           <a:p>
             <a:pPr lvl="1"/>
             <a:r>
-              <a:rPr lang="es-ES" smtClean="0"/>
+              <a:rPr lang="es-ES"/>
               <a:t>Segundo nivel</a:t>
             </a:r>
           </a:p>
           <a:p>
             <a:pPr lvl="2"/>
             <a:r>
-              <a:rPr lang="es-ES" smtClean="0"/>
+              <a:rPr lang="es-ES"/>
               <a:t>Tercer nivel</a:t>
             </a:r>
           </a:p>
           <a:p>
             <a:pPr lvl="3"/>
             <a:r>
-              <a:rPr lang="es-ES" smtClean="0"/>
+              <a:rPr lang="es-ES"/>
               <a:t>Cuarto nivel</a:t>
             </a:r>
           </a:p>
           <a:p>
             <a:pPr lvl="4"/>
             <a:r>
-              <a:rPr lang="es-ES" smtClean="0"/>
+              <a:rPr lang="es-ES"/>
               <a:t>Quinto nivel</a:t>
             </a:r>
             <a:endParaRPr lang="es-MX"/>
@@ -1201,35 +1201,35 @@
           <a:p>
             <a:pPr lvl="0"/>
             <a:r>
-              <a:rPr lang="es-ES" smtClean="0"/>
+              <a:rPr lang="es-ES"/>
               <a:t>Haga clic para modificar el estilo de texto del patrón</a:t>
             </a:r>
           </a:p>
           <a:p>
             <a:pPr lvl="1"/>
             <a:r>
-              <a:rPr lang="es-ES" smtClean="0"/>
+              <a:rPr lang="es-ES"/>
               <a:t>Segundo nivel</a:t>
             </a:r>
           </a:p>
           <a:p>
             <a:pPr lvl="2"/>
             <a:r>
-              <a:rPr lang="es-ES" smtClean="0"/>
+              <a:rPr lang="es-ES"/>
               <a:t>Tercer nivel</a:t>
             </a:r>
           </a:p>
           <a:p>
             <a:pPr lvl="3"/>
             <a:r>
-              <a:rPr lang="es-ES" smtClean="0"/>
+              <a:rPr lang="es-ES"/>
               <a:t>Cuarto nivel</a:t>
             </a:r>
           </a:p>
           <a:p>
             <a:pPr lvl="4"/>
             <a:r>
-              <a:rPr lang="es-ES" smtClean="0"/>
+              <a:rPr lang="es-ES"/>
               <a:t>Quinto nivel</a:t>
             </a:r>
             <a:endParaRPr lang="es-MX"/>
@@ -1253,7 +1253,7 @@
           <a:p>
             <a:fld id="{126F170E-E814-4B3B-A85B-D0CEE3E81FCB}" type="datetimeFigureOut">
               <a:rPr lang="es-MX" smtClean="0"/>
-              <a:t>14/01/2020</a:t>
+              <a:t>03/02/2022</a:t>
             </a:fld>
             <a:endParaRPr lang="es-MX"/>
           </a:p>
@@ -1352,7 +1352,7 @@
           <a:lstStyle/>
           <a:p>
             <a:r>
-              <a:rPr lang="es-ES" smtClean="0"/>
+              <a:rPr lang="es-ES"/>
               <a:t>Haga clic para modificar el estilo de título del patrón</a:t>
             </a:r>
             <a:endParaRPr lang="es-MX"/>
@@ -1418,7 +1418,7 @@
           <a:p>
             <a:pPr lvl="0"/>
             <a:r>
-              <a:rPr lang="es-ES" smtClean="0"/>
+              <a:rPr lang="es-ES"/>
               <a:t>Haga clic para modificar el estilo de texto del patrón</a:t>
             </a:r>
           </a:p>
@@ -1446,35 +1446,35 @@
           <a:p>
             <a:pPr lvl="0"/>
             <a:r>
-              <a:rPr lang="es-ES" smtClean="0"/>
+              <a:rPr lang="es-ES"/>
               <a:t>Haga clic para modificar el estilo de texto del patrón</a:t>
             </a:r>
           </a:p>
           <a:p>
             <a:pPr lvl="1"/>
             <a:r>
-              <a:rPr lang="es-ES" smtClean="0"/>
+              <a:rPr lang="es-ES"/>
               <a:t>Segundo nivel</a:t>
             </a:r>
           </a:p>
           <a:p>
             <a:pPr lvl="2"/>
             <a:r>
-              <a:rPr lang="es-ES" smtClean="0"/>
+              <a:rPr lang="es-ES"/>
               <a:t>Tercer nivel</a:t>
             </a:r>
           </a:p>
           <a:p>
             <a:pPr lvl="3"/>
             <a:r>
-              <a:rPr lang="es-ES" smtClean="0"/>
+              <a:rPr lang="es-ES"/>
               <a:t>Cuarto nivel</a:t>
             </a:r>
           </a:p>
           <a:p>
             <a:pPr lvl="4"/>
             <a:r>
-              <a:rPr lang="es-ES" smtClean="0"/>
+              <a:rPr lang="es-ES"/>
               <a:t>Quinto nivel</a:t>
             </a:r>
             <a:endParaRPr lang="es-MX"/>
@@ -1540,7 +1540,7 @@
           <a:p>
             <a:pPr lvl="0"/>
             <a:r>
-              <a:rPr lang="es-ES" smtClean="0"/>
+              <a:rPr lang="es-ES"/>
               <a:t>Haga clic para modificar el estilo de texto del patrón</a:t>
             </a:r>
           </a:p>
@@ -1568,35 +1568,35 @@
           <a:p>
             <a:pPr lvl="0"/>
             <a:r>
-              <a:rPr lang="es-ES" smtClean="0"/>
+              <a:rPr lang="es-ES"/>
               <a:t>Haga clic para modificar el estilo de texto del patrón</a:t>
             </a:r>
           </a:p>
           <a:p>
             <a:pPr lvl="1"/>
             <a:r>
-              <a:rPr lang="es-ES" smtClean="0"/>
+              <a:rPr lang="es-ES"/>
               <a:t>Segundo nivel</a:t>
             </a:r>
           </a:p>
           <a:p>
             <a:pPr lvl="2"/>
             <a:r>
-              <a:rPr lang="es-ES" smtClean="0"/>
+              <a:rPr lang="es-ES"/>
               <a:t>Tercer nivel</a:t>
             </a:r>
           </a:p>
           <a:p>
             <a:pPr lvl="3"/>
             <a:r>
-              <a:rPr lang="es-ES" smtClean="0"/>
+              <a:rPr lang="es-ES"/>
               <a:t>Cuarto nivel</a:t>
             </a:r>
           </a:p>
           <a:p>
             <a:pPr lvl="4"/>
             <a:r>
-              <a:rPr lang="es-ES" smtClean="0"/>
+              <a:rPr lang="es-ES"/>
               <a:t>Quinto nivel</a:t>
             </a:r>
             <a:endParaRPr lang="es-MX"/>
@@ -1620,7 +1620,7 @@
           <a:p>
             <a:fld id="{126F170E-E814-4B3B-A85B-D0CEE3E81FCB}" type="datetimeFigureOut">
               <a:rPr lang="es-MX" smtClean="0"/>
-              <a:t>14/01/2020</a:t>
+              <a:t>03/02/2022</a:t>
             </a:fld>
             <a:endParaRPr lang="es-MX"/>
           </a:p>
@@ -1714,7 +1714,7 @@
           <a:lstStyle/>
           <a:p>
             <a:r>
-              <a:rPr lang="es-ES" smtClean="0"/>
+              <a:rPr lang="es-ES"/>
               <a:t>Haga clic para modificar el estilo de título del patrón</a:t>
             </a:r>
             <a:endParaRPr lang="es-MX"/>
@@ -1738,7 +1738,7 @@
           <a:p>
             <a:fld id="{126F170E-E814-4B3B-A85B-D0CEE3E81FCB}" type="datetimeFigureOut">
               <a:rPr lang="es-MX" smtClean="0"/>
-              <a:t>14/01/2020</a:t>
+              <a:t>03/02/2022</a:t>
             </a:fld>
             <a:endParaRPr lang="es-MX"/>
           </a:p>
@@ -1833,7 +1833,7 @@
           <a:p>
             <a:fld id="{126F170E-E814-4B3B-A85B-D0CEE3E81FCB}" type="datetimeFigureOut">
               <a:rPr lang="es-MX" smtClean="0"/>
-              <a:t>14/01/2020</a:t>
+              <a:t>03/02/2022</a:t>
             </a:fld>
             <a:endParaRPr lang="es-MX"/>
           </a:p>
@@ -1936,7 +1936,7 @@
           </a:lstStyle>
           <a:p>
             <a:r>
-              <a:rPr lang="es-ES" smtClean="0"/>
+              <a:rPr lang="es-ES"/>
               <a:t>Haga clic para modificar el estilo de título del patrón</a:t>
             </a:r>
             <a:endParaRPr lang="es-MX"/>
@@ -1993,35 +1993,35 @@
           <a:p>
             <a:pPr lvl="0"/>
             <a:r>
-              <a:rPr lang="es-ES" smtClean="0"/>
+              <a:rPr lang="es-ES"/>
               <a:t>Haga clic para modificar el estilo de texto del patrón</a:t>
             </a:r>
           </a:p>
           <a:p>
             <a:pPr lvl="1"/>
             <a:r>
-              <a:rPr lang="es-ES" smtClean="0"/>
+              <a:rPr lang="es-ES"/>
               <a:t>Segundo nivel</a:t>
             </a:r>
           </a:p>
           <a:p>
             <a:pPr lvl="2"/>
             <a:r>
-              <a:rPr lang="es-ES" smtClean="0"/>
+              <a:rPr lang="es-ES"/>
               <a:t>Tercer nivel</a:t>
             </a:r>
           </a:p>
           <a:p>
             <a:pPr lvl="3"/>
             <a:r>
-              <a:rPr lang="es-ES" smtClean="0"/>
+              <a:rPr lang="es-ES"/>
               <a:t>Cuarto nivel</a:t>
             </a:r>
           </a:p>
           <a:p>
             <a:pPr lvl="4"/>
             <a:r>
-              <a:rPr lang="es-ES" smtClean="0"/>
+              <a:rPr lang="es-ES"/>
               <a:t>Quinto nivel</a:t>
             </a:r>
             <a:endParaRPr lang="es-MX"/>
@@ -2087,7 +2087,7 @@
           <a:p>
             <a:pPr lvl="0"/>
             <a:r>
-              <a:rPr lang="es-ES" smtClean="0"/>
+              <a:rPr lang="es-ES"/>
               <a:t>Haga clic para modificar el estilo de texto del patrón</a:t>
             </a:r>
           </a:p>
@@ -2110,7 +2110,7 @@
           <a:p>
             <a:fld id="{126F170E-E814-4B3B-A85B-D0CEE3E81FCB}" type="datetimeFigureOut">
               <a:rPr lang="es-MX" smtClean="0"/>
-              <a:t>14/01/2020</a:t>
+              <a:t>03/02/2022</a:t>
             </a:fld>
             <a:endParaRPr lang="es-MX"/>
           </a:p>
@@ -2213,7 +2213,7 @@
           </a:lstStyle>
           <a:p>
             <a:r>
-              <a:rPr lang="es-ES" smtClean="0"/>
+              <a:rPr lang="es-ES"/>
               <a:t>Haga clic para modificar el estilo de título del patrón</a:t>
             </a:r>
             <a:endParaRPr lang="es-MX"/>
@@ -2340,7 +2340,7 @@
           <a:p>
             <a:pPr lvl="0"/>
             <a:r>
-              <a:rPr lang="es-ES" smtClean="0"/>
+              <a:rPr lang="es-ES"/>
               <a:t>Haga clic para modificar el estilo de texto del patrón</a:t>
             </a:r>
           </a:p>
@@ -2363,7 +2363,7 @@
           <a:p>
             <a:fld id="{126F170E-E814-4B3B-A85B-D0CEE3E81FCB}" type="datetimeFigureOut">
               <a:rPr lang="es-MX" smtClean="0"/>
-              <a:t>14/01/2020</a:t>
+              <a:t>03/02/2022</a:t>
             </a:fld>
             <a:endParaRPr lang="es-MX"/>
           </a:p>
@@ -2472,7 +2472,7 @@
           <a:lstStyle/>
           <a:p>
             <a:r>
-              <a:rPr lang="es-ES" smtClean="0"/>
+              <a:rPr lang="es-ES"/>
               <a:t>Haga clic para modificar el estilo de título del patrón</a:t>
             </a:r>
             <a:endParaRPr lang="es-MX"/>
@@ -2506,35 +2506,35 @@
           <a:p>
             <a:pPr lvl="0"/>
             <a:r>
-              <a:rPr lang="es-ES" smtClean="0"/>
+              <a:rPr lang="es-ES"/>
               <a:t>Haga clic para modificar el estilo de texto del patrón</a:t>
             </a:r>
           </a:p>
           <a:p>
             <a:pPr lvl="1"/>
             <a:r>
-              <a:rPr lang="es-ES" smtClean="0"/>
+              <a:rPr lang="es-ES"/>
               <a:t>Segundo nivel</a:t>
             </a:r>
           </a:p>
           <a:p>
             <a:pPr lvl="2"/>
             <a:r>
-              <a:rPr lang="es-ES" smtClean="0"/>
+              <a:rPr lang="es-ES"/>
               <a:t>Tercer nivel</a:t>
             </a:r>
           </a:p>
           <a:p>
             <a:pPr lvl="3"/>
             <a:r>
-              <a:rPr lang="es-ES" smtClean="0"/>
+              <a:rPr lang="es-ES"/>
               <a:t>Cuarto nivel</a:t>
             </a:r>
           </a:p>
           <a:p>
             <a:pPr lvl="4"/>
             <a:r>
-              <a:rPr lang="es-ES" smtClean="0"/>
+              <a:rPr lang="es-ES"/>
               <a:t>Quinto nivel</a:t>
             </a:r>
             <a:endParaRPr lang="es-MX"/>
@@ -2576,7 +2576,7 @@
           <a:p>
             <a:fld id="{126F170E-E814-4B3B-A85B-D0CEE3E81FCB}" type="datetimeFigureOut">
               <a:rPr lang="es-MX" smtClean="0"/>
-              <a:t>14/01/2020</a:t>
+              <a:t>03/02/2022</a:t>
             </a:fld>
             <a:endParaRPr lang="es-MX"/>
           </a:p>
@@ -3195,7 +3195,7 @@
           <a:lstStyle/>
           <a:p>
             <a:r>
-              <a:rPr lang="es-ES" sz="5000" dirty="0" smtClean="0">
+              <a:rPr lang="es-ES" sz="5000" dirty="0">
                 <a:solidFill>
                   <a:srgbClr val="897F66"/>
                 </a:solidFill>
@@ -3233,7 +3233,7 @@
           <a:lstStyle/>
           <a:p>
             <a:r>
-              <a:rPr lang="es-ES" dirty="0" smtClean="0">
+              <a:rPr lang="es-ES" dirty="0">
                 <a:solidFill>
                   <a:srgbClr val="897F66"/>
                 </a:solidFill>
@@ -3271,7 +3271,7 @@
           <a:lstStyle/>
           <a:p>
             <a:r>
-              <a:rPr lang="es-ES" sz="2800" dirty="0" smtClean="0">
+              <a:rPr lang="es-ES" sz="2800" dirty="0">
                 <a:solidFill>
                   <a:srgbClr val="E0DDD6"/>
                 </a:solidFill>
@@ -3530,7 +3530,7 @@
           <a:lstStyle/>
           <a:p>
             <a:r>
-              <a:rPr lang="es-ES" dirty="0" smtClean="0">
+              <a:rPr lang="es-ES" dirty="0">
                 <a:solidFill>
                   <a:srgbClr val="897F66"/>
                 </a:solidFill>
@@ -3568,7 +3568,7 @@
           <a:lstStyle/>
           <a:p>
             <a:r>
-              <a:rPr lang="es-ES" sz="2800" dirty="0" smtClean="0">
+              <a:rPr lang="es-ES" sz="2800" dirty="0">
                 <a:solidFill>
                   <a:srgbClr val="E0DDD6"/>
                 </a:solidFill>
@@ -3607,7 +3607,7 @@
           <a:p>
             <a:pPr algn="ctr"/>
             <a:r>
-              <a:rPr lang="es-ES" sz="3600" dirty="0" smtClean="0">
+              <a:rPr lang="es-ES" sz="3600" dirty="0">
                 <a:solidFill>
                   <a:srgbClr val="E0DDD6"/>
                 </a:solidFill>
@@ -3618,7 +3618,7 @@
           <a:p>
             <a:pPr algn="ctr"/>
             <a:r>
-              <a:rPr lang="es-ES" sz="3000" dirty="0" smtClean="0">
+              <a:rPr lang="es-ES" sz="3000" dirty="0">
                 <a:solidFill>
                   <a:srgbClr val="E0DDD6"/>
                 </a:solidFill>
@@ -3629,7 +3629,7 @@
           <a:p>
             <a:pPr algn="ctr"/>
             <a:r>
-              <a:rPr lang="es-ES" sz="2000" dirty="0" smtClean="0">
+              <a:rPr lang="es-ES" sz="2000" dirty="0">
                 <a:solidFill>
                   <a:srgbClr val="E0DDD6"/>
                 </a:solidFill>
@@ -3637,7 +3637,7 @@
               <a:t>(</a:t>
             </a:r>
             <a:r>
-              <a:rPr lang="es-ES" sz="2000" dirty="0" err="1" smtClean="0">
+              <a:rPr lang="es-ES" sz="2000" dirty="0" err="1">
                 <a:solidFill>
                   <a:srgbClr val="E0DDD6"/>
                 </a:solidFill>
@@ -3645,7 +3645,7 @@
               <a:t>zorin</a:t>
             </a:r>
             <a:r>
-              <a:rPr lang="es-ES" sz="2000" dirty="0" smtClean="0">
+              <a:rPr lang="es-ES" sz="2000" dirty="0">
                 <a:solidFill>
                   <a:srgbClr val="E0DDD6"/>
                 </a:solidFill>
@@ -3653,7 +3653,7 @@
               <a:t> OS, </a:t>
             </a:r>
             <a:r>
-              <a:rPr lang="es-ES" sz="2000" dirty="0" err="1" smtClean="0">
+              <a:rPr lang="es-ES" sz="2000" dirty="0" err="1">
                 <a:solidFill>
                   <a:srgbClr val="E0DDD6"/>
                 </a:solidFill>
@@ -3661,7 +3661,7 @@
               <a:t>mxlinux</a:t>
             </a:r>
             <a:r>
-              <a:rPr lang="es-ES" sz="2000" dirty="0" smtClean="0">
+              <a:rPr lang="es-ES" sz="2000" dirty="0">
                 <a:solidFill>
                   <a:srgbClr val="E0DDD6"/>
                 </a:solidFill>
@@ -3669,7 +3669,7 @@
               <a:t>, </a:t>
             </a:r>
             <a:r>
-              <a:rPr lang="es-ES" sz="2000" dirty="0" err="1" smtClean="0">
+              <a:rPr lang="es-ES" sz="2000" dirty="0" err="1">
                 <a:solidFill>
                   <a:srgbClr val="E0DDD6"/>
                 </a:solidFill>
@@ -3677,7 +3677,7 @@
               <a:t>elementary</a:t>
             </a:r>
             <a:r>
-              <a:rPr lang="es-ES" sz="2000" dirty="0" smtClean="0">
+              <a:rPr lang="es-ES" sz="2000" dirty="0">
                 <a:solidFill>
                   <a:srgbClr val="E0DDD6"/>
                 </a:solidFill>
@@ -3688,7 +3688,7 @@
           <a:p>
             <a:pPr algn="ctr"/>
             <a:r>
-              <a:rPr lang="es-ES" sz="3000" dirty="0" smtClean="0">
+              <a:rPr lang="es-ES" sz="3000" dirty="0">
                 <a:solidFill>
                   <a:srgbClr val="E0DDD6"/>
                 </a:solidFill>
@@ -3699,7 +3699,29 @@
           <a:p>
             <a:pPr algn="ctr"/>
             <a:r>
-              <a:rPr lang="es-ES" sz="2000" dirty="0" smtClean="0">
+              <a:rPr lang="es-ES" sz="2000" dirty="0">
+                <a:solidFill>
+                  <a:srgbClr val="E0DDD6"/>
+                </a:solidFill>
+              </a:rPr>
+              <a:t>(Ubuntu, RHEL, SUSE.)</a:t>
+            </a:r>
+          </a:p>
+          <a:p>
+            <a:pPr algn="ctr"/>
+            <a:r>
+              <a:rPr lang="es-ES" sz="3000" dirty="0">
+                <a:solidFill>
+                  <a:srgbClr val="E0DDD6"/>
+                </a:solidFill>
+              </a:rPr>
+              <a:t>Linux con propósitos específicos</a:t>
+            </a:r>
+          </a:p>
+          <a:p>
+            <a:pPr algn="ctr"/>
+            <a:r>
+              <a:rPr lang="es-ES" sz="2000" dirty="0">
                 <a:solidFill>
                   <a:srgbClr val="E0DDD6"/>
                 </a:solidFill>
@@ -3707,61 +3729,7 @@
               <a:t>(</a:t>
             </a:r>
             <a:r>
-              <a:rPr lang="es-ES" sz="2000" dirty="0" err="1" smtClean="0">
-                <a:solidFill>
-                  <a:srgbClr val="E0DDD6"/>
-                </a:solidFill>
-              </a:rPr>
-              <a:t>Debian</a:t>
-            </a:r>
-            <a:r>
-              <a:rPr lang="es-ES" sz="2000" dirty="0" smtClean="0">
-                <a:solidFill>
-                  <a:srgbClr val="E0DDD6"/>
-                </a:solidFill>
-              </a:rPr>
-              <a:t>, </a:t>
-            </a:r>
-            <a:r>
-              <a:rPr lang="es-ES" sz="2000" dirty="0" err="1" smtClean="0">
-                <a:solidFill>
-                  <a:srgbClr val="E0DDD6"/>
-                </a:solidFill>
-              </a:rPr>
-              <a:t>Centos</a:t>
-            </a:r>
-            <a:r>
-              <a:rPr lang="es-ES" sz="2000" dirty="0" smtClean="0">
-                <a:solidFill>
-                  <a:srgbClr val="E0DDD6"/>
-                </a:solidFill>
-              </a:rPr>
-              <a:t>, RHEL, SUSE.)</a:t>
-            </a:r>
-          </a:p>
-          <a:p>
-            <a:pPr algn="ctr"/>
-            <a:r>
-              <a:rPr lang="es-ES" sz="3000" dirty="0" smtClean="0">
-                <a:solidFill>
-                  <a:srgbClr val="E0DDD6"/>
-                </a:solidFill>
-              </a:rPr>
-              <a:t>Linux con propósitos específicos</a:t>
-            </a:r>
-          </a:p>
-          <a:p>
-            <a:pPr algn="ctr"/>
-            <a:r>
-              <a:rPr lang="es-ES" sz="2000" dirty="0" smtClean="0">
-                <a:solidFill>
-                  <a:srgbClr val="E0DDD6"/>
-                </a:solidFill>
-              </a:rPr>
-              <a:t>(</a:t>
-            </a:r>
-            <a:r>
-              <a:rPr lang="es-ES" sz="2000" dirty="0" err="1" smtClean="0">
+              <a:rPr lang="es-ES" sz="2000" dirty="0" err="1">
                 <a:solidFill>
                   <a:srgbClr val="E0DDD6"/>
                 </a:solidFill>
@@ -3769,7 +3737,7 @@
               <a:t>Scientific</a:t>
             </a:r>
             <a:r>
-              <a:rPr lang="es-ES" sz="2000" dirty="0" smtClean="0">
+              <a:rPr lang="es-ES" sz="2000" dirty="0">
                 <a:solidFill>
                   <a:srgbClr val="E0DDD6"/>
                 </a:solidFill>
@@ -3777,7 +3745,7 @@
               <a:t> Linux, </a:t>
             </a:r>
             <a:r>
-              <a:rPr lang="es-ES" sz="2000" dirty="0" err="1" smtClean="0">
+              <a:rPr lang="es-ES" sz="2000" dirty="0" err="1">
                 <a:solidFill>
                   <a:srgbClr val="E0DDD6"/>
                 </a:solidFill>
@@ -3785,7 +3753,7 @@
               <a:t>Kali</a:t>
             </a:r>
             <a:r>
-              <a:rPr lang="es-ES" sz="2000" dirty="0" smtClean="0">
+              <a:rPr lang="es-ES" sz="2000" dirty="0">
                 <a:solidFill>
                   <a:srgbClr val="E0DDD6"/>
                 </a:solidFill>
@@ -3793,7 +3761,7 @@
               <a:t> Linux, Ubuntu </a:t>
             </a:r>
             <a:r>
-              <a:rPr lang="es-ES" sz="2000" dirty="0" err="1" smtClean="0">
+              <a:rPr lang="es-ES" sz="2000" dirty="0" err="1">
                 <a:solidFill>
                   <a:srgbClr val="E0DDD6"/>
                 </a:solidFill>
@@ -3801,7 +3769,7 @@
               <a:t>studio</a:t>
             </a:r>
             <a:r>
-              <a:rPr lang="es-ES" sz="2000" dirty="0" smtClean="0">
+              <a:rPr lang="es-ES" sz="2000" dirty="0">
                 <a:solidFill>
                   <a:srgbClr val="E0DDD6"/>
                 </a:solidFill>
@@ -4062,7 +4030,7 @@
           <a:lstStyle/>
           <a:p>
             <a:r>
-              <a:rPr lang="es-ES" dirty="0" smtClean="0">
+              <a:rPr lang="es-ES" dirty="0">
                 <a:solidFill>
                   <a:srgbClr val="897F66"/>
                 </a:solidFill>
@@ -4100,7 +4068,7 @@
           <a:lstStyle/>
           <a:p>
             <a:r>
-              <a:rPr lang="es-ES" sz="2800" dirty="0" smtClean="0">
+              <a:rPr lang="es-ES" sz="2800" dirty="0">
                 <a:solidFill>
                   <a:srgbClr val="E0DDD6"/>
                 </a:solidFill>
@@ -4139,7 +4107,7 @@
           <a:p>
             <a:pPr algn="ctr"/>
             <a:r>
-              <a:rPr lang="es-ES" sz="3600" dirty="0" smtClean="0">
+              <a:rPr lang="es-ES" sz="3600" dirty="0">
                 <a:solidFill>
                   <a:srgbClr val="E0DDD6"/>
                 </a:solidFill>
@@ -4163,21 +4131,13 @@
                   <a:srgbClr val="E0DDD6"/>
                 </a:solidFill>
               </a:rPr>
-              <a:t> (Ubuntu) e </a:t>
-            </a:r>
-            <a:r>
-              <a:rPr lang="es-ES" sz="3600" dirty="0" smtClean="0">
-                <a:solidFill>
-                  <a:srgbClr val="E0DDD6"/>
-                </a:solidFill>
-              </a:rPr>
-              <a:t>hijos</a:t>
+              <a:t> (Ubuntu) e hijos</a:t>
             </a:r>
           </a:p>
           <a:p>
             <a:pPr algn="ctr"/>
             <a:r>
-              <a:rPr lang="es-ES" sz="3600" dirty="0" err="1" smtClean="0">
+              <a:rPr lang="es-ES" sz="3600" dirty="0" err="1">
                 <a:solidFill>
                   <a:srgbClr val="E0DDD6"/>
                 </a:solidFill>
@@ -4185,7 +4145,7 @@
               <a:t>Redhat</a:t>
             </a:r>
             <a:r>
-              <a:rPr lang="es-ES" sz="3600" dirty="0" smtClean="0">
+              <a:rPr lang="es-ES" sz="3600" dirty="0">
                 <a:solidFill>
                   <a:srgbClr val="E0DDD6"/>
                 </a:solidFill>
@@ -4196,7 +4156,7 @@
           <a:p>
             <a:pPr algn="ctr"/>
             <a:r>
-              <a:rPr lang="es-ES" sz="3600" dirty="0" err="1" smtClean="0">
+              <a:rPr lang="es-ES" sz="3600" dirty="0" err="1">
                 <a:solidFill>
                   <a:srgbClr val="E0DDD6"/>
                 </a:solidFill>
@@ -4204,7 +4164,7 @@
               <a:t>Fedora</a:t>
             </a:r>
             <a:r>
-              <a:rPr lang="es-ES" sz="3600" dirty="0" smtClean="0">
+              <a:rPr lang="es-ES" sz="3600" dirty="0">
                 <a:solidFill>
                   <a:srgbClr val="E0DDD6"/>
                 </a:solidFill>
@@ -4215,7 +4175,7 @@
           <a:p>
             <a:pPr algn="ctr"/>
             <a:r>
-              <a:rPr lang="es-ES" sz="3600" dirty="0" err="1" smtClean="0">
+              <a:rPr lang="es-ES" sz="3600" dirty="0" err="1">
                 <a:solidFill>
                   <a:srgbClr val="E0DDD6"/>
                 </a:solidFill>
@@ -4223,7 +4183,7 @@
               <a:t>Arch</a:t>
             </a:r>
             <a:r>
-              <a:rPr lang="es-ES" sz="3600" dirty="0" smtClean="0">
+              <a:rPr lang="es-ES" sz="3600" dirty="0">
                 <a:solidFill>
                   <a:srgbClr val="E0DDD6"/>
                 </a:solidFill>
@@ -4234,7 +4194,7 @@
           <a:p>
             <a:pPr algn="ctr"/>
             <a:r>
-              <a:rPr lang="es-ES" sz="2000" dirty="0" smtClean="0">
+              <a:rPr lang="es-ES" sz="2000" dirty="0">
                 <a:solidFill>
                   <a:srgbClr val="E0DDD6"/>
                 </a:solidFill>
@@ -4245,7 +4205,7 @@
           <a:p>
             <a:pPr algn="ctr"/>
             <a:r>
-              <a:rPr lang="es-ES" dirty="0" smtClean="0">
+              <a:rPr lang="es-ES" dirty="0">
                 <a:solidFill>
                   <a:srgbClr val="E0DDD6"/>
                 </a:solidFill>
@@ -4253,7 +4213,7 @@
               <a:t>LFS, </a:t>
             </a:r>
             <a:r>
-              <a:rPr lang="es-ES" dirty="0" err="1" smtClean="0">
+              <a:rPr lang="es-ES" dirty="0" err="1">
                 <a:solidFill>
                   <a:srgbClr val="E0DDD6"/>
                 </a:solidFill>
@@ -4261,7 +4221,7 @@
               <a:t>slackware</a:t>
             </a:r>
             <a:r>
-              <a:rPr lang="es-ES" dirty="0" smtClean="0">
+              <a:rPr lang="es-ES" dirty="0">
                 <a:solidFill>
                   <a:srgbClr val="E0DDD6"/>
                 </a:solidFill>
@@ -4269,7 +4229,7 @@
               <a:t>, </a:t>
             </a:r>
             <a:r>
-              <a:rPr lang="es-ES" dirty="0" err="1" smtClean="0">
+              <a:rPr lang="es-ES" dirty="0" err="1">
                 <a:solidFill>
                   <a:srgbClr val="E0DDD6"/>
                 </a:solidFill>
@@ -4277,7 +4237,7 @@
               <a:t>puppy</a:t>
             </a:r>
             <a:r>
-              <a:rPr lang="es-ES" dirty="0" smtClean="0">
+              <a:rPr lang="es-ES" dirty="0">
                 <a:solidFill>
                   <a:srgbClr val="E0DDD6"/>
                 </a:solidFill>
@@ -4285,7 +4245,7 @@
               <a:t>, </a:t>
             </a:r>
             <a:r>
-              <a:rPr lang="es-ES" dirty="0" err="1" smtClean="0">
+              <a:rPr lang="es-ES" dirty="0" err="1">
                 <a:solidFill>
                   <a:srgbClr val="E0DDD6"/>
                 </a:solidFill>
@@ -4293,7 +4253,7 @@
               <a:t>Gentoo</a:t>
             </a:r>
             <a:r>
-              <a:rPr lang="es-ES" dirty="0" smtClean="0">
+              <a:rPr lang="es-ES" dirty="0">
                 <a:solidFill>
                   <a:srgbClr val="E0DDD6"/>
                 </a:solidFill>
@@ -4304,7 +4264,7 @@
           <a:p>
             <a:pPr algn="ctr"/>
             <a:r>
-              <a:rPr lang="es-ES" dirty="0" err="1" smtClean="0">
+              <a:rPr lang="es-ES" dirty="0" err="1">
                 <a:solidFill>
                   <a:srgbClr val="E0DDD6"/>
                 </a:solidFill>
@@ -4312,7 +4272,7 @@
               <a:t>Jewbuntu</a:t>
             </a:r>
             <a:r>
-              <a:rPr lang="es-ES" dirty="0" smtClean="0">
+              <a:rPr lang="es-ES" dirty="0">
                 <a:solidFill>
                   <a:srgbClr val="E0DDD6"/>
                 </a:solidFill>
@@ -4320,7 +4280,7 @@
               <a:t>, </a:t>
             </a:r>
             <a:r>
-              <a:rPr lang="es-ES" dirty="0" err="1" smtClean="0">
+              <a:rPr lang="es-ES" dirty="0" err="1">
                 <a:solidFill>
                   <a:srgbClr val="E0DDD6"/>
                 </a:solidFill>
@@ -4328,7 +4288,7 @@
               <a:t>Helal</a:t>
             </a:r>
             <a:r>
-              <a:rPr lang="es-ES" dirty="0" smtClean="0">
+              <a:rPr lang="es-ES" dirty="0">
                 <a:solidFill>
                   <a:srgbClr val="E0DDD6"/>
                 </a:solidFill>
@@ -4336,7 +4296,7 @@
               <a:t>, Suicide Linux, </a:t>
             </a:r>
             <a:r>
-              <a:rPr lang="es-ES" dirty="0" err="1" smtClean="0">
+              <a:rPr lang="es-ES" dirty="0" err="1">
                 <a:solidFill>
                   <a:srgbClr val="E0DDD6"/>
                 </a:solidFill>
@@ -4344,34 +4304,13 @@
               <a:t>Biebian</a:t>
             </a:r>
             <a:r>
-              <a:rPr lang="es-ES" dirty="0" smtClean="0">
-                <a:solidFill>
-                  <a:srgbClr val="E0DDD6"/>
-                </a:solidFill>
-              </a:rPr>
-              <a:t>, </a:t>
-            </a:r>
-            <a:r>
-              <a:rPr lang="es-ES" dirty="0" err="1" smtClean="0">
-                <a:solidFill>
-                  <a:srgbClr val="E0DDD6"/>
-                </a:solidFill>
-              </a:rPr>
-              <a:t>Lesbian</a:t>
-            </a:r>
-            <a:r>
-              <a:rPr lang="es-ES" dirty="0" err="1">
-                <a:solidFill>
-                  <a:srgbClr val="E0DDD6"/>
-                </a:solidFill>
-              </a:rPr>
-              <a:t>s</a:t>
-            </a:r>
-            <a:endParaRPr lang="es-ES" dirty="0" smtClean="0">
-              <a:solidFill>
-                <a:srgbClr val="E0DDD6"/>
-              </a:solidFill>
-            </a:endParaRPr>
+              <a:rPr lang="es-ES" dirty="0">
+                <a:solidFill>
+                  <a:srgbClr val="E0DDD6"/>
+                </a:solidFill>
+              </a:rPr>
+              <a:t>.</a:t>
+            </a:r>
           </a:p>
           <a:p>
             <a:endParaRPr lang="es-MX" sz="5000" dirty="0">
@@ -4626,7 +4565,7 @@
           <a:lstStyle/>
           <a:p>
             <a:r>
-              <a:rPr lang="es-ES" dirty="0" smtClean="0">
+              <a:rPr lang="es-ES" dirty="0">
                 <a:solidFill>
                   <a:srgbClr val="897F66"/>
                 </a:solidFill>
@@ -4664,7 +4603,7 @@
           <a:lstStyle/>
           <a:p>
             <a:r>
-              <a:rPr lang="es-ES" sz="2800" dirty="0" smtClean="0">
+              <a:rPr lang="es-ES" sz="2800" dirty="0">
                 <a:solidFill>
                   <a:srgbClr val="E0DDD6"/>
                 </a:solidFill>
@@ -4703,7 +4642,7 @@
           <a:p>
             <a:pPr algn="ctr"/>
             <a:r>
-              <a:rPr lang="es-ES" sz="3600" dirty="0" err="1" smtClean="0">
+              <a:rPr lang="es-ES" sz="3600" dirty="0" err="1">
                 <a:solidFill>
                   <a:srgbClr val="E0DDD6"/>
                 </a:solidFill>
@@ -4711,14 +4650,14 @@
               <a:t>Distrowatch</a:t>
             </a:r>
             <a:r>
-              <a:rPr lang="es-ES" sz="3600" dirty="0" smtClean="0">
+              <a:rPr lang="es-ES" sz="3600" dirty="0">
                 <a:solidFill>
                   <a:srgbClr val="E0DDD6"/>
                 </a:solidFill>
               </a:rPr>
               <a:t> a 14/01/2020</a:t>
             </a:r>
-            <a:endParaRPr lang="es-ES" dirty="0" smtClean="0">
+            <a:endParaRPr lang="es-ES" dirty="0">
               <a:solidFill>
                 <a:srgbClr val="E0DDD6"/>
               </a:solidFill>
@@ -4847,7 +4786,7 @@
         </p:blipFill>
         <p:spPr>
           <a:xfrm>
-            <a:off x="-6607" y="0"/>
+            <a:off x="-103425" y="0"/>
             <a:ext cx="12192000" cy="6858000"/>
           </a:xfrm>
           <a:prstGeom prst="rect">
@@ -5001,7 +4940,7 @@
           <a:lstStyle/>
           <a:p>
             <a:r>
-              <a:rPr lang="es-ES" dirty="0" smtClean="0">
+              <a:rPr lang="es-ES" dirty="0">
                 <a:solidFill>
                   <a:srgbClr val="897F66"/>
                 </a:solidFill>
@@ -5039,7 +4978,7 @@
           <a:lstStyle/>
           <a:p>
             <a:r>
-              <a:rPr lang="es-ES" sz="2800" dirty="0" smtClean="0">
+              <a:rPr lang="es-ES" sz="2800" dirty="0">
                 <a:solidFill>
                   <a:srgbClr val="E0DDD6"/>
                 </a:solidFill>
@@ -5062,7 +5001,7 @@
         </p:nvSpPr>
         <p:spPr>
           <a:xfrm>
-            <a:off x="3220996" y="1820036"/>
+            <a:off x="2979544" y="1802933"/>
             <a:ext cx="6219698" cy="2400657"/>
           </a:xfrm>
           <a:prstGeom prst="rect">
@@ -5078,7 +5017,7 @@
           <a:p>
             <a:pPr algn="ctr"/>
             <a:r>
-              <a:rPr lang="es-ES" sz="5000" dirty="0" smtClean="0">
+              <a:rPr lang="es-ES" sz="5000" dirty="0">
                 <a:solidFill>
                   <a:srgbClr val="E0DDD6"/>
                 </a:solidFill>
@@ -5088,7 +5027,7 @@
           </a:p>
           <a:p>
             <a:r>
-              <a:rPr lang="es-ES" sz="2000" dirty="0" smtClean="0">
+              <a:rPr lang="es-ES" sz="2000" dirty="0">
                 <a:solidFill>
                   <a:srgbClr val="E0DDD6"/>
                 </a:solidFill>
@@ -5098,36 +5037,24 @@
           </a:p>
           <a:p>
             <a:r>
-              <a:rPr lang="es-ES" sz="2000" dirty="0" smtClean="0">
+              <a:rPr lang="es-ES" sz="2000" dirty="0">
                 <a:solidFill>
                   <a:srgbClr val="E0DDD6"/>
                 </a:solidFill>
               </a:rPr>
               <a:t>Realizar el cuestionario de </a:t>
-            </a:r>
-            <a:r>
-              <a:rPr lang="es-MX" sz="2000" dirty="0" smtClean="0">
-                <a:hlinkClick r:id="rId6"/>
-              </a:rPr>
-              <a:t>https</a:t>
             </a:r>
             <a:r>
               <a:rPr lang="es-MX" sz="2000" dirty="0">
                 <a:hlinkClick r:id="rId6"/>
               </a:rPr>
-              <a:t>://distrochooser.de/es</a:t>
-            </a:r>
-            <a:r>
-              <a:rPr lang="es-MX" sz="2000" dirty="0" smtClean="0">
-                <a:hlinkClick r:id="rId6"/>
-              </a:rPr>
-              <a:t>/</a:t>
-            </a:r>
-            <a:endParaRPr lang="es-MX" sz="2000" dirty="0" smtClean="0"/>
-          </a:p>
-          <a:p>
-            <a:r>
-              <a:rPr lang="es-ES" sz="2000" dirty="0" smtClean="0">
+              <a:t>https://distrochooser.de/es/</a:t>
+            </a:r>
+            <a:endParaRPr lang="es-MX" sz="2000" dirty="0"/>
+          </a:p>
+          <a:p>
+            <a:r>
+              <a:rPr lang="es-ES" sz="2000" dirty="0">
                 <a:solidFill>
                   <a:srgbClr val="E0DDD6"/>
                 </a:solidFill>
@@ -5137,7 +5064,7 @@
           </a:p>
           <a:p>
             <a:r>
-              <a:rPr lang="es-ES" sz="2000" dirty="0" smtClean="0">
+              <a:rPr lang="es-ES" sz="2000" dirty="0">
                 <a:solidFill>
                   <a:srgbClr val="E0DDD6"/>
                 </a:solidFill>
@@ -5147,7 +5074,7 @@
           </a:p>
           <a:p>
             <a:r>
-              <a:rPr lang="es-ES" sz="2000" dirty="0" smtClean="0">
+              <a:rPr lang="es-ES" sz="2000" dirty="0">
                 <a:solidFill>
                   <a:srgbClr val="E0DDD6"/>
                 </a:solidFill>
@@ -5155,7 +5082,7 @@
               <a:t>Traer la </a:t>
             </a:r>
             <a:r>
-              <a:rPr lang="es-ES" sz="2000" dirty="0" err="1" smtClean="0">
+              <a:rPr lang="es-ES" sz="2000" dirty="0" err="1">
                 <a:solidFill>
                   <a:srgbClr val="E0DDD6"/>
                 </a:solidFill>
@@ -5163,7 +5090,7 @@
               <a:t>iso</a:t>
             </a:r>
             <a:r>
-              <a:rPr lang="es-ES" sz="2000" dirty="0" smtClean="0">
+              <a:rPr lang="es-ES" sz="2000" dirty="0">
                 <a:solidFill>
                   <a:srgbClr val="E0DDD6"/>
                 </a:solidFill>
@@ -5417,7 +5344,7 @@
           <a:lstStyle/>
           <a:p>
             <a:r>
-              <a:rPr lang="es-ES" dirty="0" smtClean="0">
+              <a:rPr lang="es-ES" dirty="0">
                 <a:solidFill>
                   <a:srgbClr val="897F66"/>
                 </a:solidFill>
@@ -5455,7 +5382,7 @@
           <a:lstStyle/>
           <a:p>
             <a:r>
-              <a:rPr lang="es-ES" sz="2800" dirty="0" smtClean="0">
+              <a:rPr lang="es-ES" sz="2800" dirty="0">
                 <a:solidFill>
                   <a:srgbClr val="E0DDD6"/>
                 </a:solidFill>
@@ -5493,7 +5420,7 @@
           <a:lstStyle/>
           <a:p>
             <a:r>
-              <a:rPr lang="es-ES" sz="5000" dirty="0" smtClean="0">
+              <a:rPr lang="es-ES" sz="5000" dirty="0">
                 <a:solidFill>
                   <a:srgbClr val="E0DDD6"/>
                 </a:solidFill>
@@ -5752,7 +5679,7 @@
           <a:lstStyle/>
           <a:p>
             <a:r>
-              <a:rPr lang="es-ES" dirty="0" smtClean="0">
+              <a:rPr lang="es-ES" dirty="0">
                 <a:solidFill>
                   <a:srgbClr val="897F66"/>
                 </a:solidFill>
@@ -5790,7 +5717,7 @@
           <a:lstStyle/>
           <a:p>
             <a:r>
-              <a:rPr lang="es-ES" sz="2800" dirty="0" smtClean="0">
+              <a:rPr lang="es-ES" sz="2800" dirty="0">
                 <a:solidFill>
                   <a:srgbClr val="E0DDD6"/>
                 </a:solidFill>
@@ -5828,7 +5755,7 @@
           <a:lstStyle/>
           <a:p>
             <a:r>
-              <a:rPr lang="es-ES" sz="5000" dirty="0" smtClean="0">
+              <a:rPr lang="es-ES" sz="5000" dirty="0">
                 <a:solidFill>
                   <a:srgbClr val="E0DDD6"/>
                 </a:solidFill>
@@ -5838,7 +5765,7 @@
           </a:p>
           <a:p>
             <a:r>
-              <a:rPr lang="es-ES" sz="5000" dirty="0" smtClean="0">
+              <a:rPr lang="es-ES" sz="5000" dirty="0">
                 <a:solidFill>
                   <a:srgbClr val="E0DDD6"/>
                 </a:solidFill>
@@ -5846,7 +5773,7 @@
               <a:t>¿Que es </a:t>
             </a:r>
             <a:r>
-              <a:rPr lang="es-ES" sz="5000" dirty="0" err="1" smtClean="0">
+              <a:rPr lang="es-ES" sz="5000" dirty="0" err="1">
                 <a:solidFill>
                   <a:srgbClr val="E0DDD6"/>
                 </a:solidFill>
@@ -5854,7 +5781,7 @@
               <a:t>copyleft</a:t>
             </a:r>
             <a:r>
-              <a:rPr lang="es-ES" sz="5000" dirty="0" smtClean="0">
+              <a:rPr lang="es-ES" sz="5000" dirty="0">
                 <a:solidFill>
                   <a:srgbClr val="E0DDD6"/>
                 </a:solidFill>
@@ -5864,7 +5791,7 @@
           </a:p>
           <a:p>
             <a:r>
-              <a:rPr lang="es-ES" sz="5000" dirty="0" smtClean="0">
+              <a:rPr lang="es-ES" sz="5000" dirty="0">
                 <a:solidFill>
                   <a:srgbClr val="E0DDD6"/>
                 </a:solidFill>
@@ -5872,7 +5799,7 @@
               <a:t>¿Que es </a:t>
             </a:r>
             <a:r>
-              <a:rPr lang="es-ES" sz="5000" dirty="0" err="1" smtClean="0">
+              <a:rPr lang="es-ES" sz="5000" dirty="0" err="1">
                 <a:solidFill>
                   <a:srgbClr val="E0DDD6"/>
                 </a:solidFill>
@@ -5880,7 +5807,7 @@
               <a:t>Gnu</a:t>
             </a:r>
             <a:r>
-              <a:rPr lang="es-ES" sz="5000" dirty="0" smtClean="0">
+              <a:rPr lang="es-ES" sz="5000" dirty="0">
                 <a:solidFill>
                   <a:srgbClr val="E0DDD6"/>
                 </a:solidFill>
@@ -5890,7 +5817,7 @@
           </a:p>
           <a:p>
             <a:r>
-              <a:rPr lang="es-ES" sz="5000" dirty="0" smtClean="0">
+              <a:rPr lang="es-ES" sz="5000" dirty="0">
                 <a:solidFill>
                   <a:srgbClr val="E0DDD6"/>
                 </a:solidFill>
@@ -5898,7 +5825,7 @@
               <a:t>¿Como nace </a:t>
             </a:r>
             <a:r>
-              <a:rPr lang="es-ES" sz="5000" dirty="0" err="1" smtClean="0">
+              <a:rPr lang="es-ES" sz="5000" dirty="0" err="1">
                 <a:solidFill>
                   <a:srgbClr val="E0DDD6"/>
                 </a:solidFill>
@@ -5906,7 +5833,7 @@
               <a:t>Gnu</a:t>
             </a:r>
             <a:r>
-              <a:rPr lang="es-ES" sz="5000" dirty="0" smtClean="0">
+              <a:rPr lang="es-ES" sz="5000" dirty="0">
                 <a:solidFill>
                   <a:srgbClr val="E0DDD6"/>
                 </a:solidFill>
@@ -6160,7 +6087,7 @@
           <a:lstStyle/>
           <a:p>
             <a:r>
-              <a:rPr lang="es-ES" dirty="0" smtClean="0">
+              <a:rPr lang="es-ES" dirty="0">
                 <a:solidFill>
                   <a:srgbClr val="897F66"/>
                 </a:solidFill>
@@ -6198,7 +6125,7 @@
           <a:lstStyle/>
           <a:p>
             <a:r>
-              <a:rPr lang="es-ES" sz="2800" dirty="0" smtClean="0">
+              <a:rPr lang="es-ES" sz="2800" dirty="0">
                 <a:solidFill>
                   <a:srgbClr val="E0DDD6"/>
                 </a:solidFill>
@@ -6236,18 +6163,13 @@
           <a:lstStyle/>
           <a:p>
             <a:r>
-              <a:rPr lang="es-ES" sz="5000" dirty="0" smtClean="0">
+              <a:rPr lang="es-ES" sz="5000" dirty="0">
                 <a:solidFill>
                   <a:srgbClr val="E0DDD6"/>
                 </a:solidFill>
               </a:rPr>
               <a:t>“El caso Office”</a:t>
             </a:r>
-            <a:endParaRPr lang="es-ES" sz="5000" dirty="0" smtClean="0">
-              <a:solidFill>
-                <a:srgbClr val="E0DDD6"/>
-              </a:solidFill>
-            </a:endParaRPr>
           </a:p>
         </p:txBody>
       </p:sp>
@@ -6495,7 +6417,7 @@
           <a:lstStyle/>
           <a:p>
             <a:r>
-              <a:rPr lang="es-ES" dirty="0" smtClean="0">
+              <a:rPr lang="es-ES" dirty="0">
                 <a:solidFill>
                   <a:srgbClr val="897F66"/>
                 </a:solidFill>
@@ -6533,7 +6455,7 @@
           <a:lstStyle/>
           <a:p>
             <a:r>
-              <a:rPr lang="es-ES" sz="2800" dirty="0" smtClean="0">
+              <a:rPr lang="es-ES" sz="2800" dirty="0">
                 <a:solidFill>
                   <a:srgbClr val="E0DDD6"/>
                 </a:solidFill>
@@ -6571,18 +6493,13 @@
           <a:lstStyle/>
           <a:p>
             <a:r>
-              <a:rPr lang="es-ES" sz="3000" dirty="0" smtClean="0">
+              <a:rPr lang="es-ES" sz="3000" dirty="0">
                 <a:solidFill>
                   <a:srgbClr val="E0DDD6"/>
                 </a:solidFill>
               </a:rPr>
               <a:t>Ventajas de Copyright  			Desventajas de Copyright</a:t>
             </a:r>
-            <a:endParaRPr lang="es-ES" sz="3000" dirty="0" smtClean="0">
-              <a:solidFill>
-                <a:srgbClr val="E0DDD6"/>
-              </a:solidFill>
-            </a:endParaRPr>
           </a:p>
         </p:txBody>
       </p:sp>
@@ -6878,7 +6795,7 @@
           <a:lstStyle/>
           <a:p>
             <a:r>
-              <a:rPr lang="es-ES" dirty="0" smtClean="0">
+              <a:rPr lang="es-ES" dirty="0">
                 <a:solidFill>
                   <a:srgbClr val="897F66"/>
                 </a:solidFill>
@@ -6916,7 +6833,7 @@
           <a:lstStyle/>
           <a:p>
             <a:r>
-              <a:rPr lang="es-ES" sz="2800" dirty="0" smtClean="0">
+              <a:rPr lang="es-ES" sz="2800" dirty="0">
                 <a:solidFill>
                   <a:srgbClr val="E0DDD6"/>
                 </a:solidFill>
@@ -6954,7 +6871,7 @@
           <a:lstStyle/>
           <a:p>
             <a:r>
-              <a:rPr lang="es-ES" sz="3000" dirty="0" smtClean="0">
+              <a:rPr lang="es-ES" sz="3000" dirty="0">
                 <a:solidFill>
                   <a:srgbClr val="E0DDD6"/>
                 </a:solidFill>
@@ -6962,7 +6879,7 @@
               <a:t>Ventajas de </a:t>
             </a:r>
             <a:r>
-              <a:rPr lang="es-ES" sz="3000" dirty="0" err="1" smtClean="0">
+              <a:rPr lang="es-ES" sz="3000" dirty="0" err="1">
                 <a:solidFill>
                   <a:srgbClr val="E0DDD6"/>
                 </a:solidFill>
@@ -6970,7 +6887,7 @@
               <a:t>Copyleft</a:t>
             </a:r>
             <a:r>
-              <a:rPr lang="es-ES" sz="3000" dirty="0" smtClean="0">
+              <a:rPr lang="es-ES" sz="3000" dirty="0">
                 <a:solidFill>
                   <a:srgbClr val="E0DDD6"/>
                 </a:solidFill>
@@ -6978,14 +6895,14 @@
               <a:t>			    Desventajas de </a:t>
             </a:r>
             <a:r>
-              <a:rPr lang="es-ES" sz="3000" dirty="0" err="1" smtClean="0">
+              <a:rPr lang="es-ES" sz="3000" dirty="0" err="1">
                 <a:solidFill>
                   <a:srgbClr val="E0DDD6"/>
                 </a:solidFill>
               </a:rPr>
               <a:t>copyleft</a:t>
             </a:r>
-            <a:endParaRPr lang="es-ES" sz="3000" dirty="0" smtClean="0">
+            <a:endParaRPr lang="es-ES" sz="3000" dirty="0">
               <a:solidFill>
                 <a:srgbClr val="E0DDD6"/>
               </a:solidFill>
@@ -7285,7 +7202,7 @@
           <a:lstStyle/>
           <a:p>
             <a:r>
-              <a:rPr lang="es-ES" dirty="0" smtClean="0">
+              <a:rPr lang="es-ES" dirty="0">
                 <a:solidFill>
                   <a:srgbClr val="897F66"/>
                 </a:solidFill>
@@ -7323,7 +7240,7 @@
           <a:lstStyle/>
           <a:p>
             <a:r>
-              <a:rPr lang="es-ES" sz="2800" dirty="0" smtClean="0">
+              <a:rPr lang="es-ES" sz="2800" dirty="0">
                 <a:solidFill>
                   <a:srgbClr val="E0DDD6"/>
                 </a:solidFill>
@@ -7361,18 +7278,13 @@
           <a:lstStyle/>
           <a:p>
             <a:r>
-              <a:rPr lang="es-ES" sz="3000" dirty="0" smtClean="0">
+              <a:rPr lang="es-ES" sz="3000" dirty="0">
                 <a:solidFill>
                   <a:srgbClr val="E0DDD6"/>
                 </a:solidFill>
               </a:rPr>
               <a:t>Búsqueda de alternativas a programas</a:t>
             </a:r>
-            <a:endParaRPr lang="es-ES" sz="3000" dirty="0" smtClean="0">
-              <a:solidFill>
-                <a:srgbClr val="E0DDD6"/>
-              </a:solidFill>
-            </a:endParaRPr>
           </a:p>
         </p:txBody>
       </p:sp>
@@ -7620,7 +7532,7 @@
           <a:lstStyle/>
           <a:p>
             <a:r>
-              <a:rPr lang="es-ES" dirty="0" smtClean="0">
+              <a:rPr lang="es-ES" dirty="0">
                 <a:solidFill>
                   <a:srgbClr val="897F66"/>
                 </a:solidFill>
@@ -7658,7 +7570,7 @@
           <a:lstStyle/>
           <a:p>
             <a:r>
-              <a:rPr lang="es-ES" sz="2800" dirty="0" smtClean="0">
+              <a:rPr lang="es-ES" sz="2800" dirty="0">
                 <a:solidFill>
                   <a:srgbClr val="E0DDD6"/>
                 </a:solidFill>
@@ -7696,28 +7608,12 @@
           <a:lstStyle/>
           <a:p>
             <a:r>
-              <a:rPr lang="es-ES" sz="5000" dirty="0" smtClean="0">
-                <a:solidFill>
-                  <a:srgbClr val="E0DDD6"/>
-                </a:solidFill>
-              </a:rPr>
-              <a:t>Windows </a:t>
-            </a:r>
-            <a:r>
               <a:rPr lang="es-ES" sz="5000" dirty="0">
                 <a:solidFill>
                   <a:srgbClr val="E0DDD6"/>
                 </a:solidFill>
               </a:rPr>
-              <a:t>vs </a:t>
-            </a:r>
-            <a:r>
-              <a:rPr lang="es-ES" sz="5000" dirty="0" smtClean="0">
-                <a:solidFill>
-                  <a:srgbClr val="E0DDD6"/>
-                </a:solidFill>
-              </a:rPr>
-              <a:t>Linux</a:t>
+              <a:t>Windows vs Linux</a:t>
             </a:r>
             <a:endParaRPr lang="es-MX" sz="5000" dirty="0">
               <a:solidFill>
@@ -7791,7 +7687,7 @@
         </p:blipFill>
         <p:spPr bwMode="auto">
           <a:xfrm>
-            <a:off x="1213668" y="2873045"/>
+            <a:off x="1213668" y="2830003"/>
             <a:ext cx="3868125" cy="2905634"/>
           </a:xfrm>
           <a:prstGeom prst="rect">
@@ -8053,7 +7949,7 @@
           <a:lstStyle/>
           <a:p>
             <a:r>
-              <a:rPr lang="es-ES" dirty="0" smtClean="0">
+              <a:rPr lang="es-ES" dirty="0">
                 <a:solidFill>
                   <a:srgbClr val="897F66"/>
                 </a:solidFill>
@@ -8091,7 +7987,7 @@
           <a:lstStyle/>
           <a:p>
             <a:r>
-              <a:rPr lang="es-ES" sz="2800" dirty="0" smtClean="0">
+              <a:rPr lang="es-ES" sz="2800" dirty="0">
                 <a:solidFill>
                   <a:srgbClr val="E0DDD6"/>
                 </a:solidFill>
@@ -8129,7 +8025,7 @@
           <a:lstStyle/>
           <a:p>
             <a:r>
-              <a:rPr lang="es-ES" sz="5000" dirty="0" smtClean="0">
+              <a:rPr lang="es-ES" sz="5000" dirty="0">
                 <a:solidFill>
                   <a:srgbClr val="E0DDD6"/>
                 </a:solidFill>
@@ -8139,7 +8035,7 @@
           </a:p>
           <a:p>
             <a:r>
-              <a:rPr lang="es-ES" sz="5000" dirty="0" smtClean="0">
+              <a:rPr lang="es-ES" sz="5000" dirty="0">
                 <a:solidFill>
                   <a:srgbClr val="E0DDD6"/>
                 </a:solidFill>
@@ -8149,7 +8045,7 @@
           </a:p>
           <a:p>
             <a:r>
-              <a:rPr lang="es-ES" sz="5000" dirty="0" smtClean="0">
+              <a:rPr lang="es-ES" sz="5000" dirty="0">
                 <a:solidFill>
                   <a:srgbClr val="E0DDD6"/>
                 </a:solidFill>

</xml_diff>